<commit_message>
Updated schema for db
</commit_message>
<xml_diff>
--- a/db/DB schema.pptx
+++ b/db/DB schema.pptx
@@ -243,7 +243,7 @@
           <a:p>
             <a:fld id="{31D4BBC5-235E-4AFB-BCA6-D5338D9E5FA0}" type="datetimeFigureOut">
               <a:rPr lang="nb-NO" smtClean="0"/>
-              <a:t>04.07.2022</a:t>
+              <a:t>31.08.2023</a:t>
             </a:fld>
             <a:endParaRPr lang="nb-NO"/>
           </a:p>
@@ -413,7 +413,7 @@
           <a:p>
             <a:fld id="{31D4BBC5-235E-4AFB-BCA6-D5338D9E5FA0}" type="datetimeFigureOut">
               <a:rPr lang="nb-NO" smtClean="0"/>
-              <a:t>04.07.2022</a:t>
+              <a:t>31.08.2023</a:t>
             </a:fld>
             <a:endParaRPr lang="nb-NO"/>
           </a:p>
@@ -593,7 +593,7 @@
           <a:p>
             <a:fld id="{31D4BBC5-235E-4AFB-BCA6-D5338D9E5FA0}" type="datetimeFigureOut">
               <a:rPr lang="nb-NO" smtClean="0"/>
-              <a:t>04.07.2022</a:t>
+              <a:t>31.08.2023</a:t>
             </a:fld>
             <a:endParaRPr lang="nb-NO"/>
           </a:p>
@@ -763,7 +763,7 @@
           <a:p>
             <a:fld id="{31D4BBC5-235E-4AFB-BCA6-D5338D9E5FA0}" type="datetimeFigureOut">
               <a:rPr lang="nb-NO" smtClean="0"/>
-              <a:t>04.07.2022</a:t>
+              <a:t>31.08.2023</a:t>
             </a:fld>
             <a:endParaRPr lang="nb-NO"/>
           </a:p>
@@ -1007,7 +1007,7 @@
           <a:p>
             <a:fld id="{31D4BBC5-235E-4AFB-BCA6-D5338D9E5FA0}" type="datetimeFigureOut">
               <a:rPr lang="nb-NO" smtClean="0"/>
-              <a:t>04.07.2022</a:t>
+              <a:t>31.08.2023</a:t>
             </a:fld>
             <a:endParaRPr lang="nb-NO"/>
           </a:p>
@@ -1239,7 +1239,7 @@
           <a:p>
             <a:fld id="{31D4BBC5-235E-4AFB-BCA6-D5338D9E5FA0}" type="datetimeFigureOut">
               <a:rPr lang="nb-NO" smtClean="0"/>
-              <a:t>04.07.2022</a:t>
+              <a:t>31.08.2023</a:t>
             </a:fld>
             <a:endParaRPr lang="nb-NO"/>
           </a:p>
@@ -1606,7 +1606,7 @@
           <a:p>
             <a:fld id="{31D4BBC5-235E-4AFB-BCA6-D5338D9E5FA0}" type="datetimeFigureOut">
               <a:rPr lang="nb-NO" smtClean="0"/>
-              <a:t>04.07.2022</a:t>
+              <a:t>31.08.2023</a:t>
             </a:fld>
             <a:endParaRPr lang="nb-NO"/>
           </a:p>
@@ -1724,7 +1724,7 @@
           <a:p>
             <a:fld id="{31D4BBC5-235E-4AFB-BCA6-D5338D9E5FA0}" type="datetimeFigureOut">
               <a:rPr lang="nb-NO" smtClean="0"/>
-              <a:t>04.07.2022</a:t>
+              <a:t>31.08.2023</a:t>
             </a:fld>
             <a:endParaRPr lang="nb-NO"/>
           </a:p>
@@ -1819,7 +1819,7 @@
           <a:p>
             <a:fld id="{31D4BBC5-235E-4AFB-BCA6-D5338D9E5FA0}" type="datetimeFigureOut">
               <a:rPr lang="nb-NO" smtClean="0"/>
-              <a:t>04.07.2022</a:t>
+              <a:t>31.08.2023</a:t>
             </a:fld>
             <a:endParaRPr lang="nb-NO"/>
           </a:p>
@@ -2096,7 +2096,7 @@
           <a:p>
             <a:fld id="{31D4BBC5-235E-4AFB-BCA6-D5338D9E5FA0}" type="datetimeFigureOut">
               <a:rPr lang="nb-NO" smtClean="0"/>
-              <a:t>04.07.2022</a:t>
+              <a:t>31.08.2023</a:t>
             </a:fld>
             <a:endParaRPr lang="nb-NO"/>
           </a:p>
@@ -2353,7 +2353,7 @@
           <a:p>
             <a:fld id="{31D4BBC5-235E-4AFB-BCA6-D5338D9E5FA0}" type="datetimeFigureOut">
               <a:rPr lang="nb-NO" smtClean="0"/>
-              <a:t>04.07.2022</a:t>
+              <a:t>31.08.2023</a:t>
             </a:fld>
             <a:endParaRPr lang="nb-NO"/>
           </a:p>
@@ -2566,7 +2566,7 @@
           <a:p>
             <a:fld id="{31D4BBC5-235E-4AFB-BCA6-D5338D9E5FA0}" type="datetimeFigureOut">
               <a:rPr lang="nb-NO" smtClean="0"/>
-              <a:t>04.07.2022</a:t>
+              <a:t>31.08.2023</a:t>
             </a:fld>
             <a:endParaRPr lang="nb-NO"/>
           </a:p>
@@ -2986,7 +2986,7 @@
           <p:nvPr>
             <p:extLst>
               <p:ext uri="{D42A27DB-BD31-4B8C-83A1-F6EECF244321}">
-                <p14:modId xmlns:p14="http://schemas.microsoft.com/office/powerpoint/2010/main" val="2339274045"/>
+                <p14:modId xmlns:p14="http://schemas.microsoft.com/office/powerpoint/2010/main" val="2059280591"/>
               </p:ext>
             </p:extLst>
           </p:nvPr>
@@ -6260,6 +6260,18 @@
                         <a:tabLst/>
                         <a:defRPr/>
                       </a:pPr>
+                      <a:r>
+                        <a:rPr lang="nb-NO" sz="600" u="none" strike="noStrike" kern="1200" dirty="0" err="1">
+                          <a:solidFill>
+                            <a:schemeClr val="dk1"/>
+                          </a:solidFill>
+                          <a:effectLst/>
+                          <a:latin typeface="+mn-lt"/>
+                          <a:ea typeface="+mn-ea"/>
+                          <a:cs typeface="+mn-cs"/>
+                        </a:rPr>
+                        <a:t>CommentVPS</a:t>
+                      </a:r>
                       <a:endParaRPr lang="nb-NO" sz="600" u="none" strike="noStrike" kern="1200" dirty="0">
                         <a:solidFill>
                           <a:schemeClr val="dk1"/>
@@ -6286,6 +6298,18 @@
                     <a:lstStyle/>
                     <a:p>
                       <a:pPr marL="0" algn="ctr" defTabSz="914400" rtl="0" eaLnBrk="1" fontAlgn="b" latinLnBrk="0" hangingPunct="1"/>
+                      <a:r>
+                        <a:rPr lang="nb-NO" sz="600" u="none" strike="noStrike" kern="1200" dirty="0" err="1">
+                          <a:solidFill>
+                            <a:schemeClr val="dk1"/>
+                          </a:solidFill>
+                          <a:effectLst/>
+                          <a:latin typeface="+mn-lt"/>
+                          <a:ea typeface="+mn-ea"/>
+                          <a:cs typeface="+mn-cs"/>
+                        </a:rPr>
+                        <a:t>TierVPS</a:t>
+                      </a:r>
                       <a:endParaRPr lang="nb-NO" sz="600" u="none" strike="noStrike" kern="1200" dirty="0">
                         <a:solidFill>
                           <a:schemeClr val="dk1"/>
@@ -6324,14 +6348,14 @@
           <p:nvPr>
             <p:extLst>
               <p:ext uri="{D42A27DB-BD31-4B8C-83A1-F6EECF244321}">
-                <p14:modId xmlns:p14="http://schemas.microsoft.com/office/powerpoint/2010/main" val="3344450056"/>
+                <p14:modId xmlns:p14="http://schemas.microsoft.com/office/powerpoint/2010/main" val="86593149"/>
               </p:ext>
             </p:extLst>
           </p:nvPr>
         </p:nvGraphicFramePr>
         <p:xfrm>
           <a:off x="4518310" y="1180908"/>
-          <a:ext cx="1410814" cy="2036393"/>
+          <a:ext cx="1410814" cy="2149886"/>
         </p:xfrm>
         <a:graphic>
           <a:graphicData uri="http://schemas.openxmlformats.org/drawingml/2006/table">
@@ -6912,6 +6936,60 @@
                 <a:extLst>
                   <a:ext uri="{0D108BD9-81ED-4DB2-BD59-A6C34878D82A}">
                     <a16:rowId xmlns:a16="http://schemas.microsoft.com/office/drawing/2014/main" val="60295672"/>
+                  </a:ext>
+                </a:extLst>
+              </a:tr>
+              <a:tr h="113493">
+                <a:tc>
+                  <a:txBody>
+                    <a:bodyPr/>
+                    <a:lstStyle/>
+                    <a:p>
+                      <a:pPr marL="0" marR="0" lvl="0" indent="0" algn="ctr" defTabSz="914400" rtl="0" eaLnBrk="1" fontAlgn="b" latinLnBrk="0" hangingPunct="1">
+                        <a:lnSpc>
+                          <a:spcPct val="100000"/>
+                        </a:lnSpc>
+                        <a:spcBef>
+                          <a:spcPts val="0"/>
+                        </a:spcBef>
+                        <a:spcAft>
+                          <a:spcPts val="0"/>
+                        </a:spcAft>
+                        <a:buClrTx/>
+                        <a:buSzTx/>
+                        <a:buFontTx/>
+                        <a:buNone/>
+                        <a:tabLst/>
+                        <a:defRPr/>
+                      </a:pPr>
+                      <a:r>
+                        <a:rPr lang="nb-NO" sz="600" u="none" strike="noStrike" kern="1200" dirty="0" err="1">
+                          <a:solidFill>
+                            <a:schemeClr val="dk1"/>
+                          </a:solidFill>
+                          <a:effectLst/>
+                          <a:latin typeface="+mn-lt"/>
+                          <a:ea typeface="+mn-ea"/>
+                          <a:cs typeface="+mn-cs"/>
+                        </a:rPr>
+                        <a:t>evidence_types</a:t>
+                      </a:r>
+                      <a:endParaRPr lang="nb-NO" sz="600" u="none" strike="noStrike" kern="1200" dirty="0">
+                        <a:solidFill>
+                          <a:schemeClr val="dk1"/>
+                        </a:solidFill>
+                        <a:effectLst/>
+                        <a:latin typeface="+mn-lt"/>
+                        <a:ea typeface="+mn-ea"/>
+                        <a:cs typeface="+mn-cs"/>
+                      </a:endParaRPr>
+                    </a:p>
+                  </a:txBody>
+                  <a:tcPr marL="9525" marR="9525" marT="9525" marB="0" anchor="b"/>
+                </a:tc>
+                <a:extLst>
+                  <a:ext uri="{0D108BD9-81ED-4DB2-BD59-A6C34878D82A}">
+                    <a16:rowId xmlns:a16="http://schemas.microsoft.com/office/drawing/2014/main" val="392872908"/>
                   </a:ext>
                 </a:extLst>
               </a:tr>
@@ -7010,14 +7088,14 @@
           <p:nvPr>
             <p:extLst>
               <p:ext uri="{D42A27DB-BD31-4B8C-83A1-F6EECF244321}">
-                <p14:modId xmlns:p14="http://schemas.microsoft.com/office/powerpoint/2010/main" val="1680384026"/>
+                <p14:modId xmlns:p14="http://schemas.microsoft.com/office/powerpoint/2010/main" val="1349476924"/>
               </p:ext>
             </p:extLst>
           </p:nvPr>
         </p:nvGraphicFramePr>
         <p:xfrm>
           <a:off x="6425854" y="339221"/>
-          <a:ext cx="1344507" cy="4300137"/>
+          <a:ext cx="1344507" cy="4410920"/>
         </p:xfrm>
         <a:graphic>
           <a:graphicData uri="http://schemas.openxmlformats.org/drawingml/2006/table">
@@ -7884,6 +7962,35 @@
                     <a:p>
                       <a:pPr marL="0" algn="ctr" defTabSz="914400" rtl="0" eaLnBrk="1" fontAlgn="b" latinLnBrk="0" hangingPunct="1"/>
                       <a:r>
+                        <a:rPr lang="nb-NO" sz="600" u="none" strike="noStrike" kern="1200" dirty="0">
+                          <a:solidFill>
+                            <a:schemeClr val="dk1"/>
+                          </a:solidFill>
+                          <a:effectLst/>
+                          <a:latin typeface="+mn-lt"/>
+                          <a:ea typeface="+mn-ea"/>
+                          <a:cs typeface="+mn-cs"/>
+                        </a:rPr>
+                        <a:t>annotation_variant2</a:t>
+                      </a:r>
+                    </a:p>
+                  </a:txBody>
+                  <a:tcPr marL="9525" marR="9525" marT="9525" marB="0" anchor="b"/>
+                </a:tc>
+                <a:extLst>
+                  <a:ext uri="{0D108BD9-81ED-4DB2-BD59-A6C34878D82A}">
+                    <a16:rowId xmlns:a16="http://schemas.microsoft.com/office/drawing/2014/main" val="2833972734"/>
+                  </a:ext>
+                </a:extLst>
+              </a:tr>
+              <a:tr h="110783">
+                <a:tc>
+                  <a:txBody>
+                    <a:bodyPr/>
+                    <a:lstStyle/>
+                    <a:p>
+                      <a:pPr marL="0" algn="ctr" defTabSz="914400" rtl="0" eaLnBrk="1" fontAlgn="b" latinLnBrk="0" hangingPunct="1"/>
+                      <a:r>
                         <a:rPr lang="nb-NO" sz="600" u="none" strike="noStrike" kern="1200" dirty="0" err="1">
                           <a:solidFill>
                             <a:schemeClr val="dk1"/>
@@ -7893,7 +8000,7 @@
                           <a:ea typeface="+mn-ea"/>
                           <a:cs typeface="+mn-cs"/>
                         </a:rPr>
-                        <a:t>function</a:t>
+                        <a:t>Function</a:t>
                       </a:r>
                       <a:endParaRPr lang="nb-NO" sz="600" u="none" strike="noStrike" kern="1200" dirty="0">
                         <a:solidFill>
@@ -7910,7 +8017,7 @@
                 </a:tc>
                 <a:extLst>
                   <a:ext uri="{0D108BD9-81ED-4DB2-BD59-A6C34878D82A}">
-                    <a16:rowId xmlns:a16="http://schemas.microsoft.com/office/drawing/2014/main" val="2833972734"/>
+                    <a16:rowId xmlns:a16="http://schemas.microsoft.com/office/drawing/2014/main" val="1935266397"/>
                   </a:ext>
                 </a:extLst>
               </a:tr>
@@ -8363,14 +8470,14 @@
           <p:nvPr>
             <p:extLst>
               <p:ext uri="{D42A27DB-BD31-4B8C-83A1-F6EECF244321}">
-                <p14:modId xmlns:p14="http://schemas.microsoft.com/office/powerpoint/2010/main" val="520190859"/>
+                <p14:modId xmlns:p14="http://schemas.microsoft.com/office/powerpoint/2010/main" val="1248508969"/>
               </p:ext>
             </p:extLst>
           </p:nvPr>
         </p:nvGraphicFramePr>
         <p:xfrm>
           <a:off x="231915" y="339221"/>
-          <a:ext cx="1410814" cy="1222726"/>
+          <a:ext cx="1410814" cy="1331503"/>
         </p:xfrm>
         <a:graphic>
           <a:graphicData uri="http://schemas.openxmlformats.org/drawingml/2006/table">
@@ -8598,7 +8705,7 @@
                           <a:ea typeface="+mn-ea"/>
                           <a:cs typeface="+mn-cs"/>
                         </a:rPr>
-                        <a:t>User_Signoff</a:t>
+                        <a:t>Seq_date</a:t>
                       </a:r>
                       <a:endParaRPr lang="nb-NO" sz="600" u="none" strike="noStrike" kern="1200" dirty="0">
                         <a:solidFill>
@@ -8611,11 +8718,11 @@
                       </a:endParaRPr>
                     </a:p>
                   </a:txBody>
-                  <a:tcPr marL="9525" marR="9525" marT="9525" marB="0" anchor="b"/>
-                </a:tc>
-                <a:extLst>
-                  <a:ext uri="{0D108BD9-81ED-4DB2-BD59-A6C34878D82A}">
-                    <a16:rowId xmlns:a16="http://schemas.microsoft.com/office/drawing/2014/main" val="654851751"/>
+                  <a:tcPr marL="15019" marR="15019" marT="15019" marB="0" anchor="b"/>
+                </a:tc>
+                <a:extLst>
+                  <a:ext uri="{0D108BD9-81ED-4DB2-BD59-A6C34878D82A}">
+                    <a16:rowId xmlns:a16="http://schemas.microsoft.com/office/drawing/2014/main" val="4290717283"/>
                   </a:ext>
                 </a:extLst>
               </a:tr>
@@ -8627,6 +8734,35 @@
                     <a:p>
                       <a:pPr marL="0" algn="ctr" defTabSz="914400" rtl="0" eaLnBrk="1" fontAlgn="b" latinLnBrk="0" hangingPunct="1"/>
                       <a:r>
+                        <a:rPr lang="nb-NO" sz="600" u="none" strike="noStrike" kern="1200" dirty="0">
+                          <a:solidFill>
+                            <a:schemeClr val="dk1"/>
+                          </a:solidFill>
+                          <a:effectLst/>
+                          <a:latin typeface="+mn-lt"/>
+                          <a:ea typeface="+mn-ea"/>
+                          <a:cs typeface="+mn-cs"/>
+                        </a:rPr>
+                        <a:t>Status</a:t>
+                      </a:r>
+                    </a:p>
+                  </a:txBody>
+                  <a:tcPr marL="15019" marR="15019" marT="15019" marB="0" anchor="b"/>
+                </a:tc>
+                <a:extLst>
+                  <a:ext uri="{0D108BD9-81ED-4DB2-BD59-A6C34878D82A}">
+                    <a16:rowId xmlns:a16="http://schemas.microsoft.com/office/drawing/2014/main" val="2971694252"/>
+                  </a:ext>
+                </a:extLst>
+              </a:tr>
+              <a:tr h="111135">
+                <a:tc>
+                  <a:txBody>
+                    <a:bodyPr/>
+                    <a:lstStyle/>
+                    <a:p>
+                      <a:pPr marL="0" algn="ctr" defTabSz="914400" rtl="0" eaLnBrk="1" fontAlgn="b" latinLnBrk="0" hangingPunct="1"/>
+                      <a:r>
                         <a:rPr lang="nb-NO" sz="600" u="none" strike="noStrike" kern="1200" dirty="0" err="1">
                           <a:solidFill>
                             <a:schemeClr val="dk1"/>
@@ -8636,7 +8772,7 @@
                           <a:ea typeface="+mn-ea"/>
                           <a:cs typeface="+mn-cs"/>
                         </a:rPr>
-                        <a:t>Date_Signoff</a:t>
+                        <a:t>User_Signoff</a:t>
                       </a:r>
                       <a:endParaRPr lang="nb-NO" sz="600" u="none" strike="noStrike" kern="1200" dirty="0">
                         <a:solidFill>
@@ -8653,7 +8789,7 @@
                 </a:tc>
                 <a:extLst>
                   <a:ext uri="{0D108BD9-81ED-4DB2-BD59-A6C34878D82A}">
-                    <a16:rowId xmlns:a16="http://schemas.microsoft.com/office/drawing/2014/main" val="1053030124"/>
+                    <a16:rowId xmlns:a16="http://schemas.microsoft.com/office/drawing/2014/main" val="654851751"/>
                   </a:ext>
                 </a:extLst>
               </a:tr>
@@ -8674,7 +8810,7 @@
                           <a:ea typeface="+mn-ea"/>
                           <a:cs typeface="+mn-cs"/>
                         </a:rPr>
-                        <a:t>User_Approval</a:t>
+                        <a:t>Date_Signoff</a:t>
                       </a:r>
                       <a:endParaRPr lang="nb-NO" sz="600" u="none" strike="noStrike" kern="1200" dirty="0">
                         <a:solidFill>
@@ -8691,7 +8827,7 @@
                 </a:tc>
                 <a:extLst>
                   <a:ext uri="{0D108BD9-81ED-4DB2-BD59-A6C34878D82A}">
-                    <a16:rowId xmlns:a16="http://schemas.microsoft.com/office/drawing/2014/main" val="2841058928"/>
+                    <a16:rowId xmlns:a16="http://schemas.microsoft.com/office/drawing/2014/main" val="1053030124"/>
                   </a:ext>
                 </a:extLst>
               </a:tr>
@@ -8703,34 +8839,17 @@
                     <a:p>
                       <a:pPr marL="0" algn="ctr" defTabSz="914400" rtl="0" eaLnBrk="1" fontAlgn="b" latinLnBrk="0" hangingPunct="1"/>
                       <a:r>
-                        <a:rPr lang="nb-NO" sz="600" u="none" strike="noStrike" kern="1200">
-                          <a:solidFill>
-                            <a:schemeClr val="dk1"/>
-                          </a:solidFill>
-                          <a:effectLst/>
-                          <a:latin typeface="+mn-lt"/>
-                          <a:ea typeface="+mn-ea"/>
-                          <a:cs typeface="+mn-cs"/>
-                        </a:rPr>
-                        <a:t>Date_Approval</a:t>
-                      </a:r>
-                    </a:p>
-                  </a:txBody>
-                  <a:tcPr marL="9525" marR="9525" marT="9525" marB="0" anchor="b"/>
-                </a:tc>
-                <a:extLst>
-                  <a:ext uri="{0D108BD9-81ED-4DB2-BD59-A6C34878D82A}">
-                    <a16:rowId xmlns:a16="http://schemas.microsoft.com/office/drawing/2014/main" val="79735779"/>
-                  </a:ext>
-                </a:extLst>
-              </a:tr>
-              <a:tr h="113493">
-                <a:tc>
-                  <a:txBody>
-                    <a:bodyPr/>
-                    <a:lstStyle/>
-                    <a:p>
-                      <a:pPr marL="0" algn="ctr" defTabSz="914400" rtl="0" eaLnBrk="1" fontAlgn="b" latinLnBrk="0" hangingPunct="1"/>
+                        <a:rPr lang="nb-NO" sz="600" u="none" strike="noStrike" kern="1200" dirty="0" err="1">
+                          <a:solidFill>
+                            <a:schemeClr val="dk1"/>
+                          </a:solidFill>
+                          <a:effectLst/>
+                          <a:latin typeface="+mn-lt"/>
+                          <a:ea typeface="+mn-ea"/>
+                          <a:cs typeface="+mn-cs"/>
+                        </a:rPr>
+                        <a:t>User_Approval</a:t>
+                      </a:r>
                       <a:endParaRPr lang="nb-NO" sz="600" u="none" strike="noStrike" kern="1200" dirty="0">
                         <a:solidFill>
                           <a:schemeClr val="dk1"/>
@@ -8742,11 +8861,40 @@
                       </a:endParaRPr>
                     </a:p>
                   </a:txBody>
-                  <a:tcPr marL="15019" marR="15019" marT="15019" marB="0" anchor="b"/>
-                </a:tc>
-                <a:extLst>
-                  <a:ext uri="{0D108BD9-81ED-4DB2-BD59-A6C34878D82A}">
-                    <a16:rowId xmlns:a16="http://schemas.microsoft.com/office/drawing/2014/main" val="1654141552"/>
+                  <a:tcPr marL="9525" marR="9525" marT="9525" marB="0" anchor="b"/>
+                </a:tc>
+                <a:extLst>
+                  <a:ext uri="{0D108BD9-81ED-4DB2-BD59-A6C34878D82A}">
+                    <a16:rowId xmlns:a16="http://schemas.microsoft.com/office/drawing/2014/main" val="2841058928"/>
+                  </a:ext>
+                </a:extLst>
+              </a:tr>
+              <a:tr h="111135">
+                <a:tc>
+                  <a:txBody>
+                    <a:bodyPr/>
+                    <a:lstStyle/>
+                    <a:p>
+                      <a:pPr marL="0" algn="ctr" defTabSz="914400" rtl="0" eaLnBrk="1" fontAlgn="b" latinLnBrk="0" hangingPunct="1"/>
+                      <a:r>
+                        <a:rPr lang="nb-NO" sz="600" u="none" strike="noStrike" kern="1200">
+                          <a:solidFill>
+                            <a:schemeClr val="dk1"/>
+                          </a:solidFill>
+                          <a:effectLst/>
+                          <a:latin typeface="+mn-lt"/>
+                          <a:ea typeface="+mn-ea"/>
+                          <a:cs typeface="+mn-cs"/>
+                        </a:rPr>
+                        <a:t>Date_Approval</a:t>
+                      </a:r>
+                    </a:p>
+                  </a:txBody>
+                  <a:tcPr marL="9525" marR="9525" marT="9525" marB="0" anchor="b"/>
+                </a:tc>
+                <a:extLst>
+                  <a:ext uri="{0D108BD9-81ED-4DB2-BD59-A6C34878D82A}">
+                    <a16:rowId xmlns:a16="http://schemas.microsoft.com/office/drawing/2014/main" val="79735779"/>
                   </a:ext>
                 </a:extLst>
               </a:tr>
@@ -8757,6 +8905,18 @@
                     <a:lstStyle/>
                     <a:p>
                       <a:pPr marL="0" algn="ctr" defTabSz="914400" rtl="0" eaLnBrk="1" fontAlgn="b" latinLnBrk="0" hangingPunct="1"/>
+                      <a:r>
+                        <a:rPr lang="nb-NO" sz="600" u="none" strike="noStrike" kern="1200" dirty="0" err="1">
+                          <a:solidFill>
+                            <a:schemeClr val="dk1"/>
+                          </a:solidFill>
+                          <a:effectLst/>
+                          <a:latin typeface="+mn-lt"/>
+                          <a:ea typeface="+mn-ea"/>
+                          <a:cs typeface="+mn-cs"/>
+                        </a:rPr>
+                        <a:t>CommentSamples</a:t>
+                      </a:r>
                       <a:endParaRPr lang="nb-NO" sz="600" u="none" strike="noStrike" kern="1200" dirty="0">
                         <a:solidFill>
                           <a:schemeClr val="dk1"/>
@@ -8772,7 +8932,7 @@
                 </a:tc>
                 <a:extLst>
                   <a:ext uri="{0D108BD9-81ED-4DB2-BD59-A6C34878D82A}">
-                    <a16:rowId xmlns:a16="http://schemas.microsoft.com/office/drawing/2014/main" val="2561503379"/>
+                    <a16:rowId xmlns:a16="http://schemas.microsoft.com/office/drawing/2014/main" val="3181060213"/>
                   </a:ext>
                 </a:extLst>
               </a:tr>

</xml_diff>